<commit_message>
works for CMH, LHR, FRA
</commit_message>
<xml_diff>
--- a/documentation.pptx
+++ b/documentation.pptx
@@ -901,7 +901,7 @@
           <a:graphicData uri="http://schemas.openxmlformats.org/presentationml/2006/ole">
             <mc:AlternateContent xmlns:mc="http://schemas.openxmlformats.org/markup-compatibility/2006">
               <mc:Choice xmlns:v="urn:schemas-microsoft-com:vml" Requires="v">
-                <p:oleObj spid="_x0000_s5126" name="think-cell Slide" r:id="rId5" imgW="347" imgH="348" progId="TCLayout.ActiveDocument.1">
+                <p:oleObj spid="_x0000_s5127" name="think-cell Slide" r:id="rId5" imgW="347" imgH="348" progId="TCLayout.ActiveDocument.1">
                   <p:embed/>
                 </p:oleObj>
               </mc:Choice>
@@ -1244,7 +1244,7 @@
           <a:graphicData uri="http://schemas.openxmlformats.org/presentationml/2006/ole">
             <mc:AlternateContent xmlns:mc="http://schemas.openxmlformats.org/markup-compatibility/2006">
               <mc:Choice xmlns:v="urn:schemas-microsoft-com:vml" Requires="v">
-                <p:oleObj spid="_x0000_s2058" name="think-cell Slide" r:id="rId4" imgW="347" imgH="348" progId="TCLayout.ActiveDocument.1">
+                <p:oleObj spid="_x0000_s2059" name="think-cell Slide" r:id="rId4" imgW="347" imgH="348" progId="TCLayout.ActiveDocument.1">
                   <p:embed/>
                 </p:oleObj>
               </mc:Choice>
@@ -1587,7 +1587,7 @@
           <a:graphicData uri="http://schemas.openxmlformats.org/presentationml/2006/ole">
             <mc:AlternateContent xmlns:mc="http://schemas.openxmlformats.org/markup-compatibility/2006">
               <mc:Choice xmlns:v="urn:schemas-microsoft-com:vml" Requires="v">
-                <p:oleObj spid="_x0000_s1034" name="think-cell Slide" r:id="rId7" imgW="231" imgH="232" progId="TCLayout.ActiveDocument.1">
+                <p:oleObj spid="_x0000_s1035" name="think-cell Slide" r:id="rId7" imgW="231" imgH="232" progId="TCLayout.ActiveDocument.1">
                   <p:embed/>
                 </p:oleObj>
               </mc:Choice>
@@ -2277,7 +2277,7 @@
           <a:graphicData uri="http://schemas.openxmlformats.org/presentationml/2006/ole">
             <mc:AlternateContent xmlns:mc="http://schemas.openxmlformats.org/markup-compatibility/2006">
               <mc:Choice xmlns:v="urn:schemas-microsoft-com:vml" Requires="v">
-                <p:oleObj spid="_x0000_s3084" name="think-cell Slide" r:id="rId5" imgW="347" imgH="348" progId="TCLayout.ActiveDocument.1">
+                <p:oleObj spid="_x0000_s3085" name="think-cell Slide" r:id="rId5" imgW="347" imgH="348" progId="TCLayout.ActiveDocument.1">
                   <p:embed/>
                 </p:oleObj>
               </mc:Choice>
@@ -3102,7 +3102,7 @@
           <a:graphicData uri="http://schemas.openxmlformats.org/presentationml/2006/ole">
             <mc:AlternateContent xmlns:mc="http://schemas.openxmlformats.org/markup-compatibility/2006">
               <mc:Choice xmlns:v="urn:schemas-microsoft-com:vml" Requires="v">
-                <p:oleObj spid="_x0000_s4107" name="think-cell Slide" r:id="rId5" imgW="347" imgH="348" progId="TCLayout.ActiveDocument.1">
+                <p:oleObj spid="_x0000_s4108" name="think-cell Slide" r:id="rId5" imgW="347" imgH="348" progId="TCLayout.ActiveDocument.1">
                   <p:embed/>
                 </p:oleObj>
               </mc:Choice>
@@ -3684,7 +3684,7 @@
           <a:graphicData uri="http://schemas.openxmlformats.org/presentationml/2006/ole">
             <mc:AlternateContent xmlns:mc="http://schemas.openxmlformats.org/markup-compatibility/2006">
               <mc:Choice xmlns:v="urn:schemas-microsoft-com:vml" Requires="v">
-                <p:oleObj spid="_x0000_s7170" name="think-cell Slide" r:id="rId6" imgW="347" imgH="348" progId="TCLayout.ActiveDocument.1">
+                <p:oleObj spid="_x0000_s7171" name="think-cell Slide" r:id="rId6" imgW="347" imgH="348" progId="TCLayout.ActiveDocument.1">
                   <p:embed/>
                 </p:oleObj>
               </mc:Choice>
@@ -3895,7 +3895,7 @@
           <a:graphicData uri="http://schemas.openxmlformats.org/presentationml/2006/ole">
             <mc:AlternateContent xmlns:mc="http://schemas.openxmlformats.org/markup-compatibility/2006">
               <mc:Choice xmlns:v="urn:schemas-microsoft-com:vml" Requires="v">
-                <p:oleObj spid="_x0000_s6150" name="think-cell Slide" r:id="rId5" imgW="347" imgH="348" progId="TCLayout.ActiveDocument.1">
+                <p:oleObj spid="_x0000_s6151" name="think-cell Slide" r:id="rId5" imgW="347" imgH="348" progId="TCLayout.ActiveDocument.1">
                   <p:embed/>
                 </p:oleObj>
               </mc:Choice>

</xml_diff>